<commit_message>
tweeks from 1st day
</commit_message>
<xml_diff>
--- a/instructors/01_Welcome_v2.0.pptx
+++ b/instructors/01_Welcome_v2.0.pptx
@@ -248,7 +248,7 @@
           <a:p>
             <a:fld id="{CC29EC85-173F-467E-B364-65AD14726A23}" type="datetimeFigureOut">
               <a:rPr lang="en-GB" smtClean="0"/>
-              <a:t>19/10/2021</a:t>
+              <a:t>18/01/2024</a:t>
             </a:fld>
             <a:endParaRPr lang="en-GB"/>
           </a:p>
@@ -311,7 +311,7 @@
           <p:nvPr userDrawn="1"/>
         </p:nvPicPr>
         <p:blipFill>
-          <a:blip r:embed="rId2" cstate="hqprint">
+          <a:blip r:embed="rId2" cstate="print">
             <a:extLst>
               <a:ext uri="{28A0092B-C50C-407E-A947-70E740481C1C}">
                 <a14:useLocalDpi xmlns:a14="http://schemas.microsoft.com/office/drawing/2010/main" val="0"/>
@@ -465,7 +465,7 @@
           <a:p>
             <a:fld id="{CC29EC85-173F-467E-B364-65AD14726A23}" type="datetimeFigureOut">
               <a:rPr lang="en-GB" smtClean="0"/>
-              <a:t>19/10/2021</a:t>
+              <a:t>18/01/2024</a:t>
             </a:fld>
             <a:endParaRPr lang="en-GB"/>
           </a:p>
@@ -645,7 +645,7 @@
           <a:p>
             <a:fld id="{CC29EC85-173F-467E-B364-65AD14726A23}" type="datetimeFigureOut">
               <a:rPr lang="en-GB" smtClean="0"/>
-              <a:t>19/10/2021</a:t>
+              <a:t>18/01/2024</a:t>
             </a:fld>
             <a:endParaRPr lang="en-GB"/>
           </a:p>
@@ -815,7 +815,7 @@
           <a:p>
             <a:fld id="{CC29EC85-173F-467E-B364-65AD14726A23}" type="datetimeFigureOut">
               <a:rPr lang="en-GB" smtClean="0"/>
-              <a:t>19/10/2021</a:t>
+              <a:t>18/01/2024</a:t>
             </a:fld>
             <a:endParaRPr lang="en-GB"/>
           </a:p>
@@ -1061,7 +1061,7 @@
           <a:p>
             <a:fld id="{CC29EC85-173F-467E-B364-65AD14726A23}" type="datetimeFigureOut">
               <a:rPr lang="en-GB" smtClean="0"/>
-              <a:t>19/10/2021</a:t>
+              <a:t>18/01/2024</a:t>
             </a:fld>
             <a:endParaRPr lang="en-GB"/>
           </a:p>
@@ -1293,7 +1293,7 @@
           <a:p>
             <a:fld id="{CC29EC85-173F-467E-B364-65AD14726A23}" type="datetimeFigureOut">
               <a:rPr lang="en-GB" smtClean="0"/>
-              <a:t>19/10/2021</a:t>
+              <a:t>18/01/2024</a:t>
             </a:fld>
             <a:endParaRPr lang="en-GB"/>
           </a:p>
@@ -1660,7 +1660,7 @@
           <a:p>
             <a:fld id="{CC29EC85-173F-467E-B364-65AD14726A23}" type="datetimeFigureOut">
               <a:rPr lang="en-GB" smtClean="0"/>
-              <a:t>19/10/2021</a:t>
+              <a:t>18/01/2024</a:t>
             </a:fld>
             <a:endParaRPr lang="en-GB"/>
           </a:p>
@@ -1778,7 +1778,7 @@
           <a:p>
             <a:fld id="{CC29EC85-173F-467E-B364-65AD14726A23}" type="datetimeFigureOut">
               <a:rPr lang="en-GB" smtClean="0"/>
-              <a:t>19/10/2021</a:t>
+              <a:t>18/01/2024</a:t>
             </a:fld>
             <a:endParaRPr lang="en-GB"/>
           </a:p>
@@ -1873,7 +1873,7 @@
           <a:p>
             <a:fld id="{CC29EC85-173F-467E-B364-65AD14726A23}" type="datetimeFigureOut">
               <a:rPr lang="en-GB" smtClean="0"/>
-              <a:t>19/10/2021</a:t>
+              <a:t>18/01/2024</a:t>
             </a:fld>
             <a:endParaRPr lang="en-GB"/>
           </a:p>
@@ -2150,7 +2150,7 @@
           <a:p>
             <a:fld id="{CC29EC85-173F-467E-B364-65AD14726A23}" type="datetimeFigureOut">
               <a:rPr lang="en-GB" smtClean="0"/>
-              <a:t>19/10/2021</a:t>
+              <a:t>18/01/2024</a:t>
             </a:fld>
             <a:endParaRPr lang="en-GB"/>
           </a:p>
@@ -2403,7 +2403,7 @@
           <a:p>
             <a:fld id="{CC29EC85-173F-467E-B364-65AD14726A23}" type="datetimeFigureOut">
               <a:rPr lang="en-GB" smtClean="0"/>
-              <a:t>19/10/2021</a:t>
+              <a:t>18/01/2024</a:t>
             </a:fld>
             <a:endParaRPr lang="en-GB"/>
           </a:p>
@@ -2615,7 +2615,7 @@
             <a:fld id="{CC29EC85-173F-467E-B364-65AD14726A23}" type="datetimeFigureOut">
               <a:rPr lang="en-GB" smtClean="0"/>
               <a:pPr/>
-              <a:t>19/10/2021</a:t>
+              <a:t>18/01/2024</a:t>
             </a:fld>
             <a:endParaRPr lang="en-GB"/>
           </a:p>
@@ -2711,7 +2711,7 @@
           <p:nvPr userDrawn="1"/>
         </p:nvPicPr>
         <p:blipFill>
-          <a:blip r:embed="rId13" cstate="hqprint">
+          <a:blip r:embed="rId13" cstate="print">
             <a:extLst>
               <a:ext uri="{28A0092B-C50C-407E-A947-70E740481C1C}">
                 <a14:useLocalDpi xmlns:a14="http://schemas.microsoft.com/office/drawing/2010/main" val="0"/>
@@ -3081,7 +3081,7 @@
           <a:p>
             <a:r>
               <a:rPr lang="pl-PL" dirty="0"/>
-              <a:t>FAIR in (bio) practice</a:t>
+              <a:t>FAIR in (circadian) practice</a:t>
             </a:r>
             <a:endParaRPr lang="en-GB" dirty="0"/>
           </a:p>
@@ -4479,7 +4479,7 @@
             <a:effectLst/>
             <a:extLst>
               <a:ext uri="{AF507438-7753-43e0-B8FC-AC1667EBCBE1}">
-                <a14:hiddenEffects xmlns="" xmlns:a14="http://schemas.microsoft.com/office/drawing/2010/main">
+                <a14:hiddenEffects xmlns:a14="http://schemas.microsoft.com/office/drawing/2010/main" xmlns="">
                   <a:effectLst>
                     <a:outerShdw dist="35921" dir="2700000" algn="ctr" rotWithShape="0">
                       <a:schemeClr val="bg2"/>
@@ -4541,7 +4541,7 @@
             <a:effectLst/>
             <a:extLst>
               <a:ext uri="{AF507438-7753-43e0-B8FC-AC1667EBCBE1}">
-                <a14:hiddenEffects xmlns="" xmlns:a14="http://schemas.microsoft.com/office/drawing/2010/main">
+                <a14:hiddenEffects xmlns:a14="http://schemas.microsoft.com/office/drawing/2010/main" xmlns="">
                   <a:effectLst>
                     <a:outerShdw dist="35921" dir="2700000" algn="ctr" rotWithShape="0">
                       <a:schemeClr val="bg2"/>
@@ -4603,7 +4603,7 @@
             <a:effectLst/>
             <a:extLst>
               <a:ext uri="{AF507438-7753-43e0-B8FC-AC1667EBCBE1}">
-                <a14:hiddenEffects xmlns="" xmlns:a14="http://schemas.microsoft.com/office/drawing/2010/main">
+                <a14:hiddenEffects xmlns:a14="http://schemas.microsoft.com/office/drawing/2010/main" xmlns="">
                   <a:effectLst>
                     <a:outerShdw dist="35921" dir="2700000" algn="ctr" rotWithShape="0">
                       <a:schemeClr val="bg2"/>
@@ -4802,7 +4802,7 @@
           <a:effectLst/>
           <a:extLst>
             <a:ext uri="{AF507438-7753-43e0-B8FC-AC1667EBCBE1}">
-              <a14:hiddenEffects xmlns="" xmlns:a14="http://schemas.microsoft.com/office/drawing/2010/main">
+              <a14:hiddenEffects xmlns:a14="http://schemas.microsoft.com/office/drawing/2010/main" xmlns="">
                 <a:effectLst>
                   <a:outerShdw dist="35921" dir="2700000" algn="ctr" rotWithShape="0">
                     <a:schemeClr val="bg2"/>
@@ -5133,7 +5133,7 @@
             <a:effectLst/>
             <a:extLst>
               <a:ext uri="{AF507438-7753-43e0-B8FC-AC1667EBCBE1}">
-                <a14:hiddenEffects xmlns="" xmlns:a14="http://schemas.microsoft.com/office/drawing/2010/main">
+                <a14:hiddenEffects xmlns:a14="http://schemas.microsoft.com/office/drawing/2010/main" xmlns="">
                   <a:effectLst>
                     <a:outerShdw dist="35921" dir="2700000" algn="ctr" rotWithShape="0">
                       <a:schemeClr val="bg2"/>
@@ -5195,7 +5195,7 @@
             <a:effectLst/>
             <a:extLst>
               <a:ext uri="{AF507438-7753-43e0-B8FC-AC1667EBCBE1}">
-                <a14:hiddenEffects xmlns="" xmlns:a14="http://schemas.microsoft.com/office/drawing/2010/main">
+                <a14:hiddenEffects xmlns:a14="http://schemas.microsoft.com/office/drawing/2010/main" xmlns="">
                   <a:effectLst>
                     <a:outerShdw dist="35921" dir="2700000" algn="ctr" rotWithShape="0">
                       <a:schemeClr val="bg2"/>
@@ -5272,7 +5272,7 @@
             <a:effectLst/>
             <a:extLst>
               <a:ext uri="{AF507438-7753-43e0-B8FC-AC1667EBCBE1}">
-                <a14:hiddenEffects xmlns="" xmlns:a14="http://schemas.microsoft.com/office/drawing/2010/main">
+                <a14:hiddenEffects xmlns:a14="http://schemas.microsoft.com/office/drawing/2010/main" xmlns="">
                   <a:effectLst>
                     <a:outerShdw dist="35921" dir="2700000" algn="ctr" rotWithShape="0">
                       <a:schemeClr val="bg2"/>
@@ -5334,7 +5334,7 @@
             <a:effectLst/>
             <a:extLst>
               <a:ext uri="{AF507438-7753-43e0-B8FC-AC1667EBCBE1}">
-                <a14:hiddenEffects xmlns="" xmlns:a14="http://schemas.microsoft.com/office/drawing/2010/main">
+                <a14:hiddenEffects xmlns:a14="http://schemas.microsoft.com/office/drawing/2010/main" xmlns="">
                   <a:effectLst>
                     <a:outerShdw dist="35921" dir="2700000" algn="ctr" rotWithShape="0">
                       <a:schemeClr val="bg2"/>
@@ -6567,7 +6567,7 @@
           <a:effectLst/>
           <a:extLst>
             <a:ext uri="{AF507438-7753-43e0-B8FC-AC1667EBCBE1}">
-              <a14:hiddenEffects xmlns="" xmlns:a14="http://schemas.microsoft.com/office/drawing/2010/main">
+              <a14:hiddenEffects xmlns:a14="http://schemas.microsoft.com/office/drawing/2010/main" xmlns="">
                 <a:effectLst>
                   <a:outerShdw dist="35921" dir="2700000" algn="ctr" rotWithShape="0">
                     <a:schemeClr val="bg2"/>
@@ -6929,7 +6929,7 @@
           <a:p>
             <a:r>
               <a:rPr lang="pl-PL" sz="4000" dirty="0"/>
-              <a:t>Day 4: Public repositories, Putting it all toghether</a:t>
+              <a:t>Day 4: Public repositories, DMP, Putting it all toghether</a:t>
             </a:r>
             <a:endParaRPr lang="en-GB" sz="4000" dirty="0"/>
           </a:p>
@@ -7028,21 +7028,42 @@
           <a:lstStyle/>
           <a:p>
             <a:r>
+              <a:rPr lang="pl-PL" sz="3200" dirty="0"/>
+              <a:t>Breaks</a:t>
+            </a:r>
+          </a:p>
+          <a:p>
+            <a:r>
+              <a:rPr lang="pl-PL" sz="3200" dirty="0"/>
+              <a:t>Questions and r</a:t>
+            </a:r>
+            <a:r>
+              <a:rPr lang="en-GB" sz="3200" dirty="0" err="1"/>
+              <a:t>aising</a:t>
+            </a:r>
+            <a:r>
               <a:rPr lang="en-GB" sz="3200" dirty="0"/>
-              <a:t>Raising hands</a:t>
+              <a:t> hands</a:t>
             </a:r>
           </a:p>
           <a:p>
             <a:r>
               <a:rPr lang="en-GB" sz="3200" dirty="0"/>
-              <a:t>Yes/No sticker</a:t>
-            </a:r>
-          </a:p>
-          <a:p>
+              <a:t>Chatroom for links</a:t>
+            </a:r>
+            <a:r>
+              <a:rPr lang="pl-PL" sz="3200" dirty="0"/>
+              <a:t> and comments</a:t>
+            </a:r>
             <a:r>
               <a:rPr lang="en-GB" sz="3200" dirty="0"/>
-              <a:t>Chatroom for links not for jokes</a:t>
-            </a:r>
+              <a:t> not for </a:t>
+            </a:r>
+            <a:r>
+              <a:rPr lang="pl-PL" sz="3200" dirty="0"/>
+              <a:t>spam</a:t>
+            </a:r>
+            <a:endParaRPr lang="en-GB" sz="3200" dirty="0"/>
           </a:p>
           <a:p>
             <a:r>

</xml_diff>